<commit_message>
Corrected mistakes and added w11 materials.
</commit_message>
<xml_diff>
--- a/teaching/f15_cpsc217/Week_10_1.pptx
+++ b/teaching/f15_cpsc217/Week_10_1.pptx
@@ -5116,7 +5116,7 @@
                 </a:solidFill>
                 <a:latin typeface="Consolas" panose="020B0609020204030204" pitchFamily="49" charset="0"/>
               </a:rPr>
-              <a:t>canada_airport_code</a:t>
+              <a:t>names_approved</a:t>
             </a:r>
             <a:r>
               <a:rPr lang="en-CA" dirty="0" smtClean="0">
@@ -5125,15 +5125,24 @@
                 </a:solidFill>
                 <a:latin typeface="Consolas" panose="020B0609020204030204" pitchFamily="49" charset="0"/>
               </a:rPr>
-              <a:t>[‘cam’]</a:t>
-            </a:r>
-          </a:p>
-          <a:p>
+              <a:t>[‘</a:t>
+            </a:r>
             <a:r>
               <a:rPr lang="en-CA" dirty="0" smtClean="0">
                 <a:solidFill>
                   <a:srgbClr val="006666"/>
                 </a:solidFill>
+                <a:latin typeface="Consolas" panose="020B0609020204030204" pitchFamily="49" charset="0"/>
+              </a:rPr>
+              <a:t>cam’]</a:t>
+            </a:r>
+          </a:p>
+          <a:p>
+            <a:r>
+              <a:rPr lang="en-CA" dirty="0" smtClean="0">
+                <a:solidFill>
+                  <a:srgbClr val="006666"/>
+                </a:solidFill>
               </a:rPr>
               <a:t>SOLUTION #5:</a:t>
             </a:r>
@@ -5184,13 +5193,13 @@
               <a:t>print(</a:t>
             </a:r>
             <a:r>
-              <a:rPr lang="en-CA" dirty="0" err="1" smtClean="0">
-                <a:solidFill>
-                  <a:srgbClr val="006666"/>
-                </a:solidFill>
-                <a:latin typeface="Consolas" panose="020B0609020204030204" pitchFamily="49" charset="0"/>
-              </a:rPr>
-              <a:t>canada_airport_code</a:t>
+              <a:rPr lang="en-CA" smtClean="0">
+                <a:solidFill>
+                  <a:srgbClr val="006666"/>
+                </a:solidFill>
+                <a:latin typeface="Consolas" panose="020B0609020204030204" pitchFamily="49" charset="0"/>
+              </a:rPr>
+              <a:t>names_approved[k</a:t>
             </a:r>
             <a:r>
               <a:rPr lang="en-CA" dirty="0" smtClean="0">
@@ -5199,7 +5208,7 @@
                 </a:solidFill>
                 <a:latin typeface="Consolas" panose="020B0609020204030204" pitchFamily="49" charset="0"/>
               </a:rPr>
-              <a:t>[k])</a:t>
+              <a:t>])</a:t>
             </a:r>
           </a:p>
           <a:p>
@@ -6902,7 +6911,6 @@
               <a:rPr lang="en-US" dirty="0" smtClean="0"/>
               <a:t>Dictionary</a:t>
             </a:r>
-            <a:endParaRPr lang="en-US" dirty="0" smtClean="0"/>
           </a:p>
         </p:txBody>
       </p:sp>

</xml_diff>